<commit_message>
2017/9/19 meeting minutes update
</commit_message>
<xml_diff>
--- a/document/Admin頁面v1.pptx
+++ b/document/Admin頁面v1.pptx
@@ -155,18 +155,10 @@
 <file path=ppt/commentAuthors.xml><?xml version="1.0" encoding="utf-8"?>
 <p:cmAuthorLst xmlns:a="http://schemas.openxmlformats.org/drawingml/2006/main" xmlns:r="http://schemas.openxmlformats.org/officeDocument/2006/relationships" xmlns:p="http://schemas.openxmlformats.org/presentationml/2006/main">
   <p:cmAuthor id="1" name="Microsoft Office 使用者" initials="Office" lastIdx="1" clrIdx="0">
-    <p:extLst>
-      <p:ext uri="{19B8F6BF-5375-455C-9EA6-DF929625EA0E}">
-        <p15:presenceInfo xmlns:p15="http://schemas.microsoft.com/office/powerpoint/2012/main" userId="" providerId=""/>
-      </p:ext>
-    </p:extLst>
+    <p:extLst/>
   </p:cmAuthor>
   <p:cmAuthor id="2" name="Microsoft Office 使用者" initials="Office [2]" lastIdx="1" clrIdx="1">
-    <p:extLst>
-      <p:ext uri="{19B8F6BF-5375-455C-9EA6-DF929625EA0E}">
-        <p15:presenceInfo xmlns:p15="http://schemas.microsoft.com/office/powerpoint/2012/main" userId="" providerId=""/>
-      </p:ext>
-    </p:extLst>
+    <p:extLst/>
   </p:cmAuthor>
 </p:cmAuthorLst>
 </file>
@@ -253,7 +245,7 @@
           <a:p>
             <a:fld id="{AF194DCC-E902-0048-A8E0-76712603E8DE}" type="datetimeFigureOut">
               <a:rPr kumimoji="1" lang="zh-TW" altLang="en-US" smtClean="0"/>
-              <a:t>2017/9/19</a:t>
+              <a:t>2017/9/24</a:t>
             </a:fld>
             <a:endParaRPr kumimoji="1" lang="zh-TW" altLang="en-US"/>
           </a:p>
@@ -540,7 +532,7 @@
       </p:grpSpPr>
       <p:sp>
         <p:nvSpPr>
-          <p:cNvPr id="2" name="投影片影像版面配置區 1"/>
+          <p:cNvPr id="2" name="投影片圖像版面配置區 1"/>
           <p:cNvSpPr>
             <a:spLocks noGrp="1" noRot="1" noChangeAspect="1"/>
           </p:cNvSpPr>
@@ -565,11 +557,7 @@
           <a:bodyPr/>
           <a:lstStyle/>
           <a:p>
-            <a:r>
-              <a:rPr kumimoji="1" lang="zh-TW" altLang="en-US" dirty="0" smtClean="0"/>
-              <a:t>新增攝影機後需出現現在位置</a:t>
-            </a:r>
-            <a:endParaRPr kumimoji="1" lang="zh-TW" altLang="en-US" dirty="0"/>
+            <a:endParaRPr lang="zh-TW" altLang="en-US" dirty="0"/>
           </a:p>
         </p:txBody>
       </p:sp>
@@ -590,7 +578,7 @@
           <a:p>
             <a:fld id="{7FC221C1-E376-2642-AABD-1173F9F94976}" type="slidenum">
               <a:rPr kumimoji="1" lang="zh-TW" altLang="en-US" smtClean="0"/>
-              <a:t>2</a:t>
+              <a:t>1</a:t>
             </a:fld>
             <a:endParaRPr kumimoji="1" lang="zh-TW" altLang="en-US"/>
           </a:p>
@@ -599,7 +587,7 @@
     </p:spTree>
     <p:extLst>
       <p:ext uri="{BB962C8B-B14F-4D97-AF65-F5344CB8AC3E}">
-        <p14:creationId xmlns:p14="http://schemas.microsoft.com/office/powerpoint/2010/main" val="2044897763"/>
+        <p14:creationId xmlns:p14="http://schemas.microsoft.com/office/powerpoint/2010/main" val="960078366"/>
       </p:ext>
     </p:extLst>
   </p:cSld>
@@ -654,8 +642,116 @@
           <a:lstStyle/>
           <a:p>
             <a:r>
+              <a:rPr kumimoji="1" lang="en-US" altLang="zh-TW" dirty="0" smtClean="0"/>
+              <a:t>2017/9/19</a:t>
+            </a:r>
+            <a:r>
+              <a:rPr kumimoji="1" lang="zh-TW" altLang="en-US" dirty="0" smtClean="0"/>
+              <a:t>新增</a:t>
+            </a:r>
+            <a:r>
+              <a:rPr kumimoji="1" lang="zh-TW" altLang="en-US" dirty="0" smtClean="0"/>
+              <a:t>攝影機後需出現現在位置</a:t>
+            </a:r>
+            <a:endParaRPr kumimoji="1" lang="zh-TW" altLang="en-US" dirty="0"/>
+          </a:p>
+        </p:txBody>
+      </p:sp>
+      <p:sp>
+        <p:nvSpPr>
+          <p:cNvPr id="4" name="投影片編號版面配置區 3"/>
+          <p:cNvSpPr>
+            <a:spLocks noGrp="1"/>
+          </p:cNvSpPr>
+          <p:nvPr>
+            <p:ph type="sldNum" sz="quarter" idx="10"/>
+          </p:nvPr>
+        </p:nvSpPr>
+        <p:spPr/>
+        <p:txBody>
+          <a:bodyPr/>
+          <a:lstStyle/>
+          <a:p>
+            <a:fld id="{7FC221C1-E376-2642-AABD-1173F9F94976}" type="slidenum">
+              <a:rPr kumimoji="1" lang="zh-TW" altLang="en-US" smtClean="0"/>
+              <a:t>2</a:t>
+            </a:fld>
+            <a:endParaRPr kumimoji="1" lang="zh-TW" altLang="en-US"/>
+          </a:p>
+        </p:txBody>
+      </p:sp>
+    </p:spTree>
+    <p:extLst>
+      <p:ext uri="{BB962C8B-B14F-4D97-AF65-F5344CB8AC3E}">
+        <p14:creationId xmlns:p14="http://schemas.microsoft.com/office/powerpoint/2010/main" val="2044897763"/>
+      </p:ext>
+    </p:extLst>
+  </p:cSld>
+  <p:clrMapOvr>
+    <a:masterClrMapping/>
+  </p:clrMapOvr>
+</p:notes>
+</file>
+
+<file path=ppt/notesSlides/notesSlide3.xml><?xml version="1.0" encoding="utf-8"?>
+<p:notes xmlns:a="http://schemas.openxmlformats.org/drawingml/2006/main" xmlns:r="http://schemas.openxmlformats.org/officeDocument/2006/relationships" xmlns:p="http://schemas.openxmlformats.org/presentationml/2006/main">
+  <p:cSld>
+    <p:spTree>
+      <p:nvGrpSpPr>
+        <p:cNvPr id="1" name=""/>
+        <p:cNvGrpSpPr/>
+        <p:nvPr/>
+      </p:nvGrpSpPr>
+      <p:grpSpPr>
+        <a:xfrm>
+          <a:off x="0" y="0"/>
+          <a:ext cx="0" cy="0"/>
+          <a:chOff x="0" y="0"/>
+          <a:chExt cx="0" cy="0"/>
+        </a:xfrm>
+      </p:grpSpPr>
+      <p:sp>
+        <p:nvSpPr>
+          <p:cNvPr id="2" name="投影片影像版面配置區 1"/>
+          <p:cNvSpPr>
+            <a:spLocks noGrp="1" noRot="1" noChangeAspect="1"/>
+          </p:cNvSpPr>
+          <p:nvPr>
+            <p:ph type="sldImg"/>
+          </p:nvPr>
+        </p:nvSpPr>
+        <p:spPr/>
+      </p:sp>
+      <p:sp>
+        <p:nvSpPr>
+          <p:cNvPr id="3" name="備忘稿版面配置區 2"/>
+          <p:cNvSpPr>
+            <a:spLocks noGrp="1"/>
+          </p:cNvSpPr>
+          <p:nvPr>
+            <p:ph type="body" idx="1"/>
+          </p:nvPr>
+        </p:nvSpPr>
+        <p:spPr/>
+        <p:txBody>
+          <a:bodyPr/>
+          <a:lstStyle/>
+          <a:p>
+            <a:r>
+              <a:rPr kumimoji="1" lang="en-US" altLang="zh-TW" dirty="0" smtClean="0"/>
+              <a:t>2017/9/19</a:t>
+            </a:r>
+            <a:r>
+              <a:rPr kumimoji="1" lang="zh-TW" altLang="en-US" dirty="0" smtClean="0"/>
+              <a:t> </a:t>
+            </a:r>
+            <a:r>
               <a:rPr kumimoji="1" lang="zh-TW" altLang="pt-BR" dirty="0" smtClean="0"/>
-              <a:t>刪除後需要可以救回，</a:t>
+              <a:t>刪除</a:t>
+            </a:r>
+            <a:r>
+              <a:rPr kumimoji="1" lang="zh-TW" altLang="pt-BR" dirty="0" smtClean="0"/>
+              <a:t>後需要可以救回，</a:t>
             </a:r>
             <a:r>
               <a:rPr kumimoji="1" lang="pt-BR" altLang="zh-TW" dirty="0" err="1" smtClean="0"/>
@@ -890,7 +986,7 @@
           <a:p>
             <a:fld id="{C58FEB62-690E-4E98-88E7-5DD4D49ECFE1}" type="datetimeFigureOut">
               <a:rPr lang="zh-TW" altLang="en-US" smtClean="0"/>
-              <a:t>2017/9/19</a:t>
+              <a:t>2017/9/24</a:t>
             </a:fld>
             <a:endParaRPr lang="zh-TW" altLang="en-US"/>
           </a:p>
@@ -1060,7 +1156,7 @@
           <a:p>
             <a:fld id="{C58FEB62-690E-4E98-88E7-5DD4D49ECFE1}" type="datetimeFigureOut">
               <a:rPr lang="zh-TW" altLang="en-US" smtClean="0"/>
-              <a:t>2017/9/19</a:t>
+              <a:t>2017/9/24</a:t>
             </a:fld>
             <a:endParaRPr lang="zh-TW" altLang="en-US"/>
           </a:p>
@@ -1240,7 +1336,7 @@
           <a:p>
             <a:fld id="{C58FEB62-690E-4E98-88E7-5DD4D49ECFE1}" type="datetimeFigureOut">
               <a:rPr lang="zh-TW" altLang="en-US" smtClean="0"/>
-              <a:t>2017/9/19</a:t>
+              <a:t>2017/9/24</a:t>
             </a:fld>
             <a:endParaRPr lang="zh-TW" altLang="en-US"/>
           </a:p>
@@ -1410,7 +1506,7 @@
           <a:p>
             <a:fld id="{C58FEB62-690E-4E98-88E7-5DD4D49ECFE1}" type="datetimeFigureOut">
               <a:rPr lang="zh-TW" altLang="en-US" smtClean="0"/>
-              <a:t>2017/9/19</a:t>
+              <a:t>2017/9/24</a:t>
             </a:fld>
             <a:endParaRPr lang="zh-TW" altLang="en-US"/>
           </a:p>
@@ -1656,7 +1752,7 @@
           <a:p>
             <a:fld id="{C58FEB62-690E-4E98-88E7-5DD4D49ECFE1}" type="datetimeFigureOut">
               <a:rPr lang="zh-TW" altLang="en-US" smtClean="0"/>
-              <a:t>2017/9/19</a:t>
+              <a:t>2017/9/24</a:t>
             </a:fld>
             <a:endParaRPr lang="zh-TW" altLang="en-US"/>
           </a:p>
@@ -1944,7 +2040,7 @@
           <a:p>
             <a:fld id="{C58FEB62-690E-4E98-88E7-5DD4D49ECFE1}" type="datetimeFigureOut">
               <a:rPr lang="zh-TW" altLang="en-US" smtClean="0"/>
-              <a:t>2017/9/19</a:t>
+              <a:t>2017/9/24</a:t>
             </a:fld>
             <a:endParaRPr lang="zh-TW" altLang="en-US"/>
           </a:p>
@@ -2366,7 +2462,7 @@
           <a:p>
             <a:fld id="{C58FEB62-690E-4E98-88E7-5DD4D49ECFE1}" type="datetimeFigureOut">
               <a:rPr lang="zh-TW" altLang="en-US" smtClean="0"/>
-              <a:t>2017/9/19</a:t>
+              <a:t>2017/9/24</a:t>
             </a:fld>
             <a:endParaRPr lang="zh-TW" altLang="en-US"/>
           </a:p>
@@ -2484,7 +2580,7 @@
           <a:p>
             <a:fld id="{C58FEB62-690E-4E98-88E7-5DD4D49ECFE1}" type="datetimeFigureOut">
               <a:rPr lang="zh-TW" altLang="en-US" smtClean="0"/>
-              <a:t>2017/9/19</a:t>
+              <a:t>2017/9/24</a:t>
             </a:fld>
             <a:endParaRPr lang="zh-TW" altLang="en-US"/>
           </a:p>
@@ -2579,7 +2675,7 @@
           <a:p>
             <a:fld id="{C58FEB62-690E-4E98-88E7-5DD4D49ECFE1}" type="datetimeFigureOut">
               <a:rPr lang="zh-TW" altLang="en-US" smtClean="0"/>
-              <a:t>2017/9/19</a:t>
+              <a:t>2017/9/24</a:t>
             </a:fld>
             <a:endParaRPr lang="zh-TW" altLang="en-US"/>
           </a:p>
@@ -2856,7 +2952,7 @@
           <a:p>
             <a:fld id="{C58FEB62-690E-4E98-88E7-5DD4D49ECFE1}" type="datetimeFigureOut">
               <a:rPr lang="zh-TW" altLang="en-US" smtClean="0"/>
-              <a:t>2017/9/19</a:t>
+              <a:t>2017/9/24</a:t>
             </a:fld>
             <a:endParaRPr lang="zh-TW" altLang="en-US"/>
           </a:p>
@@ -3109,7 +3205,7 @@
           <a:p>
             <a:fld id="{C58FEB62-690E-4E98-88E7-5DD4D49ECFE1}" type="datetimeFigureOut">
               <a:rPr lang="zh-TW" altLang="en-US" smtClean="0"/>
-              <a:t>2017/9/19</a:t>
+              <a:t>2017/9/24</a:t>
             </a:fld>
             <a:endParaRPr lang="zh-TW" altLang="en-US"/>
           </a:p>
@@ -3322,7 +3418,7 @@
           <a:p>
             <a:fld id="{C58FEB62-690E-4E98-88E7-5DD4D49ECFE1}" type="datetimeFigureOut">
               <a:rPr lang="zh-TW" altLang="en-US" smtClean="0"/>
-              <a:t>2017/9/19</a:t>
+              <a:t>2017/9/24</a:t>
             </a:fld>
             <a:endParaRPr lang="zh-TW" altLang="en-US"/>
           </a:p>
@@ -3706,7 +3802,7 @@
           <p:nvPr/>
         </p:nvPicPr>
         <p:blipFill>
-          <a:blip r:embed="rId2" cstate="print">
+          <a:blip r:embed="rId3" cstate="print">
             <a:extLst>
               <a:ext uri="{28A0092B-C50C-407E-A947-70E740481C1C}">
                 <a14:useLocalDpi xmlns:a14="http://schemas.microsoft.com/office/drawing/2010/main" val="0"/>
@@ -3868,7 +3964,7 @@
           <p:nvPr/>
         </p:nvPicPr>
         <p:blipFill>
-          <a:blip r:embed="rId3">
+          <a:blip r:embed="rId4">
             <a:extLst>
               <a:ext uri="{28A0092B-C50C-407E-A947-70E740481C1C}">
                 <a14:useLocalDpi xmlns:a14="http://schemas.microsoft.com/office/drawing/2010/main" val="0"/>

</xml_diff>

<commit_message>
history of dogs can have self tail
</commit_message>
<xml_diff>
--- a/document/Admin頁面v1.pptx
+++ b/document/Admin頁面v1.pptx
@@ -155,18 +155,10 @@
 <file path=ppt/commentAuthors.xml><?xml version="1.0" encoding="utf-8"?>
 <p:cmAuthorLst xmlns:a="http://schemas.openxmlformats.org/drawingml/2006/main" xmlns:r="http://schemas.openxmlformats.org/officeDocument/2006/relationships" xmlns:p="http://schemas.openxmlformats.org/presentationml/2006/main">
   <p:cmAuthor id="1" name="Microsoft Office 使用者" initials="Office" lastIdx="1" clrIdx="0">
-    <p:extLst>
-      <p:ext uri="{19B8F6BF-5375-455C-9EA6-DF929625EA0E}">
-        <p15:presenceInfo xmlns:p15="http://schemas.microsoft.com/office/powerpoint/2012/main" userId="" providerId=""/>
-      </p:ext>
-    </p:extLst>
+    <p:extLst/>
   </p:cmAuthor>
   <p:cmAuthor id="2" name="Microsoft Office 使用者" initials="Office [2]" lastIdx="1" clrIdx="1">
-    <p:extLst>
-      <p:ext uri="{19B8F6BF-5375-455C-9EA6-DF929625EA0E}">
-        <p15:presenceInfo xmlns:p15="http://schemas.microsoft.com/office/powerpoint/2012/main" userId="" providerId=""/>
-      </p:ext>
-    </p:extLst>
+    <p:extLst/>
   </p:cmAuthor>
 </p:cmAuthorLst>
 </file>
@@ -253,7 +245,7 @@
           <a:p>
             <a:fld id="{AF194DCC-E902-0048-A8E0-76712603E8DE}" type="datetimeFigureOut">
               <a:rPr kumimoji="1" lang="zh-TW" altLang="en-US" smtClean="0"/>
-              <a:t>2017/9/19</a:t>
+              <a:t>2017/9/24</a:t>
             </a:fld>
             <a:endParaRPr kumimoji="1" lang="zh-TW" altLang="en-US"/>
           </a:p>
@@ -540,7 +532,7 @@
       </p:grpSpPr>
       <p:sp>
         <p:nvSpPr>
-          <p:cNvPr id="2" name="投影片影像版面配置區 1"/>
+          <p:cNvPr id="2" name="投影片圖像版面配置區 1"/>
           <p:cNvSpPr>
             <a:spLocks noGrp="1" noRot="1" noChangeAspect="1"/>
           </p:cNvSpPr>
@@ -565,11 +557,7 @@
           <a:bodyPr/>
           <a:lstStyle/>
           <a:p>
-            <a:r>
-              <a:rPr kumimoji="1" lang="zh-TW" altLang="en-US" dirty="0" smtClean="0"/>
-              <a:t>新增攝影機後需出現現在位置</a:t>
-            </a:r>
-            <a:endParaRPr kumimoji="1" lang="zh-TW" altLang="en-US" dirty="0"/>
+            <a:endParaRPr lang="zh-TW" altLang="en-US" dirty="0"/>
           </a:p>
         </p:txBody>
       </p:sp>
@@ -590,7 +578,7 @@
           <a:p>
             <a:fld id="{7FC221C1-E376-2642-AABD-1173F9F94976}" type="slidenum">
               <a:rPr kumimoji="1" lang="zh-TW" altLang="en-US" smtClean="0"/>
-              <a:t>2</a:t>
+              <a:t>1</a:t>
             </a:fld>
             <a:endParaRPr kumimoji="1" lang="zh-TW" altLang="en-US"/>
           </a:p>
@@ -599,7 +587,7 @@
     </p:spTree>
     <p:extLst>
       <p:ext uri="{BB962C8B-B14F-4D97-AF65-F5344CB8AC3E}">
-        <p14:creationId xmlns:p14="http://schemas.microsoft.com/office/powerpoint/2010/main" val="2044897763"/>
+        <p14:creationId xmlns:p14="http://schemas.microsoft.com/office/powerpoint/2010/main" val="960078366"/>
       </p:ext>
     </p:extLst>
   </p:cSld>
@@ -654,8 +642,120 @@
           <a:lstStyle/>
           <a:p>
             <a:r>
+              <a:rPr kumimoji="1" lang="en-US" altLang="zh-TW" dirty="0" smtClean="0"/>
+              <a:t>2017/9/19</a:t>
+            </a:r>
+            <a:r>
+              <a:rPr kumimoji="1" lang="zh-TW" altLang="en-US" dirty="0" smtClean="0"/>
+              <a:t>新增攝影機後需出現現在位置</a:t>
+            </a:r>
+            <a:endParaRPr kumimoji="1" lang="zh-TW" altLang="en-US" dirty="0"/>
+          </a:p>
+        </p:txBody>
+      </p:sp>
+      <p:sp>
+        <p:nvSpPr>
+          <p:cNvPr id="4" name="投影片編號版面配置區 3"/>
+          <p:cNvSpPr>
+            <a:spLocks noGrp="1"/>
+          </p:cNvSpPr>
+          <p:nvPr>
+            <p:ph type="sldNum" sz="quarter" idx="10"/>
+          </p:nvPr>
+        </p:nvSpPr>
+        <p:spPr/>
+        <p:txBody>
+          <a:bodyPr/>
+          <a:lstStyle/>
+          <a:p>
+            <a:fld id="{7FC221C1-E376-2642-AABD-1173F9F94976}" type="slidenum">
+              <a:rPr kumimoji="1" lang="zh-TW" altLang="en-US" smtClean="0"/>
+              <a:t>2</a:t>
+            </a:fld>
+            <a:endParaRPr kumimoji="1" lang="zh-TW" altLang="en-US"/>
+          </a:p>
+        </p:txBody>
+      </p:sp>
+    </p:spTree>
+    <p:extLst>
+      <p:ext uri="{BB962C8B-B14F-4D97-AF65-F5344CB8AC3E}">
+        <p14:creationId xmlns:p14="http://schemas.microsoft.com/office/powerpoint/2010/main" val="2044897763"/>
+      </p:ext>
+    </p:extLst>
+  </p:cSld>
+  <p:clrMapOvr>
+    <a:masterClrMapping/>
+  </p:clrMapOvr>
+</p:notes>
+</file>
+
+<file path=ppt/notesSlides/notesSlide3.xml><?xml version="1.0" encoding="utf-8"?>
+<p:notes xmlns:a="http://schemas.openxmlformats.org/drawingml/2006/main" xmlns:r="http://schemas.openxmlformats.org/officeDocument/2006/relationships" xmlns:p="http://schemas.openxmlformats.org/presentationml/2006/main">
+  <p:cSld>
+    <p:spTree>
+      <p:nvGrpSpPr>
+        <p:cNvPr id="1" name=""/>
+        <p:cNvGrpSpPr/>
+        <p:nvPr/>
+      </p:nvGrpSpPr>
+      <p:grpSpPr>
+        <a:xfrm>
+          <a:off x="0" y="0"/>
+          <a:ext cx="0" cy="0"/>
+          <a:chOff x="0" y="0"/>
+          <a:chExt cx="0" cy="0"/>
+        </a:xfrm>
+      </p:grpSpPr>
+      <p:sp>
+        <p:nvSpPr>
+          <p:cNvPr id="2" name="投影片影像版面配置區 1"/>
+          <p:cNvSpPr>
+            <a:spLocks noGrp="1" noRot="1" noChangeAspect="1"/>
+          </p:cNvSpPr>
+          <p:nvPr>
+            <p:ph type="sldImg"/>
+          </p:nvPr>
+        </p:nvSpPr>
+        <p:spPr/>
+      </p:sp>
+      <p:sp>
+        <p:nvSpPr>
+          <p:cNvPr id="3" name="備忘稿版面配置區 2"/>
+          <p:cNvSpPr>
+            <a:spLocks noGrp="1"/>
+          </p:cNvSpPr>
+          <p:nvPr>
+            <p:ph type="body" idx="1"/>
+          </p:nvPr>
+        </p:nvSpPr>
+        <p:spPr/>
+        <p:txBody>
+          <a:bodyPr/>
+          <a:lstStyle/>
+          <a:p>
+            <a:r>
+              <a:rPr kumimoji="1" lang="en-US" altLang="zh-TW" dirty="0" smtClean="0"/>
+              <a:t>2017/9/19</a:t>
+            </a:r>
+            <a:r>
+              <a:rPr kumimoji="1" lang="zh-TW" altLang="en-US" dirty="0" smtClean="0"/>
+              <a:t> </a:t>
+            </a:r>
+            <a:r>
+              <a:rPr kumimoji="1" lang="en-US" altLang="zh-TW" dirty="0" smtClean="0"/>
+              <a:t>future work</a:t>
+            </a:r>
+            <a:r>
+              <a:rPr kumimoji="1" lang="zh-TW" altLang="en-US" dirty="0" smtClean="0"/>
+              <a:t>：</a:t>
+            </a:r>
+            <a:r>
               <a:rPr kumimoji="1" lang="zh-TW" altLang="pt-BR" dirty="0" smtClean="0"/>
-              <a:t>刪除後需要可以救回，</a:t>
+              <a:t>刪除</a:t>
+            </a:r>
+            <a:r>
+              <a:rPr kumimoji="1" lang="zh-TW" altLang="pt-BR" dirty="0" smtClean="0"/>
+              <a:t>後需要可以救回，</a:t>
             </a:r>
             <a:r>
               <a:rPr kumimoji="1" lang="pt-BR" altLang="zh-TW" dirty="0" err="1" smtClean="0"/>
@@ -890,7 +990,7 @@
           <a:p>
             <a:fld id="{C58FEB62-690E-4E98-88E7-5DD4D49ECFE1}" type="datetimeFigureOut">
               <a:rPr lang="zh-TW" altLang="en-US" smtClean="0"/>
-              <a:t>2017/9/19</a:t>
+              <a:t>2017/9/24</a:t>
             </a:fld>
             <a:endParaRPr lang="zh-TW" altLang="en-US"/>
           </a:p>
@@ -1060,7 +1160,7 @@
           <a:p>
             <a:fld id="{C58FEB62-690E-4E98-88E7-5DD4D49ECFE1}" type="datetimeFigureOut">
               <a:rPr lang="zh-TW" altLang="en-US" smtClean="0"/>
-              <a:t>2017/9/19</a:t>
+              <a:t>2017/9/24</a:t>
             </a:fld>
             <a:endParaRPr lang="zh-TW" altLang="en-US"/>
           </a:p>
@@ -1240,7 +1340,7 @@
           <a:p>
             <a:fld id="{C58FEB62-690E-4E98-88E7-5DD4D49ECFE1}" type="datetimeFigureOut">
               <a:rPr lang="zh-TW" altLang="en-US" smtClean="0"/>
-              <a:t>2017/9/19</a:t>
+              <a:t>2017/9/24</a:t>
             </a:fld>
             <a:endParaRPr lang="zh-TW" altLang="en-US"/>
           </a:p>
@@ -1410,7 +1510,7 @@
           <a:p>
             <a:fld id="{C58FEB62-690E-4E98-88E7-5DD4D49ECFE1}" type="datetimeFigureOut">
               <a:rPr lang="zh-TW" altLang="en-US" smtClean="0"/>
-              <a:t>2017/9/19</a:t>
+              <a:t>2017/9/24</a:t>
             </a:fld>
             <a:endParaRPr lang="zh-TW" altLang="en-US"/>
           </a:p>
@@ -1656,7 +1756,7 @@
           <a:p>
             <a:fld id="{C58FEB62-690E-4E98-88E7-5DD4D49ECFE1}" type="datetimeFigureOut">
               <a:rPr lang="zh-TW" altLang="en-US" smtClean="0"/>
-              <a:t>2017/9/19</a:t>
+              <a:t>2017/9/24</a:t>
             </a:fld>
             <a:endParaRPr lang="zh-TW" altLang="en-US"/>
           </a:p>
@@ -1944,7 +2044,7 @@
           <a:p>
             <a:fld id="{C58FEB62-690E-4E98-88E7-5DD4D49ECFE1}" type="datetimeFigureOut">
               <a:rPr lang="zh-TW" altLang="en-US" smtClean="0"/>
-              <a:t>2017/9/19</a:t>
+              <a:t>2017/9/24</a:t>
             </a:fld>
             <a:endParaRPr lang="zh-TW" altLang="en-US"/>
           </a:p>
@@ -2366,7 +2466,7 @@
           <a:p>
             <a:fld id="{C58FEB62-690E-4E98-88E7-5DD4D49ECFE1}" type="datetimeFigureOut">
               <a:rPr lang="zh-TW" altLang="en-US" smtClean="0"/>
-              <a:t>2017/9/19</a:t>
+              <a:t>2017/9/24</a:t>
             </a:fld>
             <a:endParaRPr lang="zh-TW" altLang="en-US"/>
           </a:p>
@@ -2484,7 +2584,7 @@
           <a:p>
             <a:fld id="{C58FEB62-690E-4E98-88E7-5DD4D49ECFE1}" type="datetimeFigureOut">
               <a:rPr lang="zh-TW" altLang="en-US" smtClean="0"/>
-              <a:t>2017/9/19</a:t>
+              <a:t>2017/9/24</a:t>
             </a:fld>
             <a:endParaRPr lang="zh-TW" altLang="en-US"/>
           </a:p>
@@ -2579,7 +2679,7 @@
           <a:p>
             <a:fld id="{C58FEB62-690E-4E98-88E7-5DD4D49ECFE1}" type="datetimeFigureOut">
               <a:rPr lang="zh-TW" altLang="en-US" smtClean="0"/>
-              <a:t>2017/9/19</a:t>
+              <a:t>2017/9/24</a:t>
             </a:fld>
             <a:endParaRPr lang="zh-TW" altLang="en-US"/>
           </a:p>
@@ -2856,7 +2956,7 @@
           <a:p>
             <a:fld id="{C58FEB62-690E-4E98-88E7-5DD4D49ECFE1}" type="datetimeFigureOut">
               <a:rPr lang="zh-TW" altLang="en-US" smtClean="0"/>
-              <a:t>2017/9/19</a:t>
+              <a:t>2017/9/24</a:t>
             </a:fld>
             <a:endParaRPr lang="zh-TW" altLang="en-US"/>
           </a:p>
@@ -3109,7 +3209,7 @@
           <a:p>
             <a:fld id="{C58FEB62-690E-4E98-88E7-5DD4D49ECFE1}" type="datetimeFigureOut">
               <a:rPr lang="zh-TW" altLang="en-US" smtClean="0"/>
-              <a:t>2017/9/19</a:t>
+              <a:t>2017/9/24</a:t>
             </a:fld>
             <a:endParaRPr lang="zh-TW" altLang="en-US"/>
           </a:p>
@@ -3322,7 +3422,7 @@
           <a:p>
             <a:fld id="{C58FEB62-690E-4E98-88E7-5DD4D49ECFE1}" type="datetimeFigureOut">
               <a:rPr lang="zh-TW" altLang="en-US" smtClean="0"/>
-              <a:t>2017/9/19</a:t>
+              <a:t>2017/9/24</a:t>
             </a:fld>
             <a:endParaRPr lang="zh-TW" altLang="en-US"/>
           </a:p>
@@ -3706,7 +3806,7 @@
           <p:nvPr/>
         </p:nvPicPr>
         <p:blipFill>
-          <a:blip r:embed="rId2" cstate="print">
+          <a:blip r:embed="rId3" cstate="print">
             <a:extLst>
               <a:ext uri="{28A0092B-C50C-407E-A947-70E740481C1C}">
                 <a14:useLocalDpi xmlns:a14="http://schemas.microsoft.com/office/drawing/2010/main" val="0"/>
@@ -3868,7 +3968,7 @@
           <p:nvPr/>
         </p:nvPicPr>
         <p:blipFill>
-          <a:blip r:embed="rId3">
+          <a:blip r:embed="rId4">
             <a:extLst>
               <a:ext uri="{28A0092B-C50C-407E-A947-70E740481C1C}">
                 <a14:useLocalDpi xmlns:a14="http://schemas.microsoft.com/office/drawing/2010/main" val="0"/>
@@ -5117,6 +5217,78 @@
           </a:p>
         </p:txBody>
       </p:sp>
+      <p:pic>
+        <p:nvPicPr>
+          <p:cNvPr id="34" name="圖片 33"/>
+          <p:cNvPicPr>
+            <a:picLocks noChangeAspect="1"/>
+          </p:cNvPicPr>
+          <p:nvPr/>
+        </p:nvPicPr>
+        <p:blipFill>
+          <a:blip r:embed="rId6" cstate="print">
+            <a:extLst>
+              <a:ext uri="{28A0092B-C50C-407E-A947-70E740481C1C}">
+                <a14:useLocalDpi xmlns:a14="http://schemas.microsoft.com/office/drawing/2010/main" val="0"/>
+              </a:ext>
+            </a:extLst>
+          </a:blip>
+          <a:stretch>
+            <a:fillRect/>
+          </a:stretch>
+        </p:blipFill>
+        <p:spPr>
+          <a:xfrm>
+            <a:off x="6079714" y="3330131"/>
+            <a:ext cx="719507" cy="601185"/>
+          </a:xfrm>
+          <a:prstGeom prst="rect">
+            <a:avLst/>
+          </a:prstGeom>
+        </p:spPr>
+      </p:pic>
+      <p:sp>
+        <p:nvSpPr>
+          <p:cNvPr id="35" name="文字方塊 34"/>
+          <p:cNvSpPr txBox="1"/>
+          <p:nvPr/>
+        </p:nvSpPr>
+        <p:spPr>
+          <a:xfrm>
+            <a:off x="6056292" y="3592762"/>
+            <a:ext cx="1345690" cy="338554"/>
+          </a:xfrm>
+          <a:prstGeom prst="rect">
+            <a:avLst/>
+          </a:prstGeom>
+          <a:noFill/>
+        </p:spPr>
+        <p:txBody>
+          <a:bodyPr wrap="square" rtlCol="0">
+            <a:spAutoFit/>
+          </a:bodyPr>
+          <a:lstStyle/>
+          <a:p>
+            <a:r>
+              <a:rPr lang="zh-TW" altLang="en-US" sz="1600" dirty="0" smtClean="0">
+                <a:solidFill>
+                  <a:schemeClr val="accent2">
+                    <a:lumMod val="75000"/>
+                  </a:schemeClr>
+                </a:solidFill>
+              </a:rPr>
+              <a:t>現在位置</a:t>
+            </a:r>
+            <a:endParaRPr lang="zh-TW" altLang="en-US" sz="1600" dirty="0">
+              <a:solidFill>
+                <a:schemeClr val="accent2">
+                  <a:lumMod val="75000"/>
+                </a:schemeClr>
+              </a:solidFill>
+            </a:endParaRPr>
+          </a:p>
+        </p:txBody>
+      </p:sp>
     </p:spTree>
     <p:extLst>
       <p:ext uri="{BB962C8B-B14F-4D97-AF65-F5344CB8AC3E}">
@@ -5969,6 +6141,78 @@
               <a:latin typeface="Arial Unicode MS" panose="020B0604020202020204" pitchFamily="34" charset="-120"/>
               <a:ea typeface="Arial Unicode MS" panose="020B0604020202020204" pitchFamily="34" charset="-120"/>
               <a:cs typeface="Arial Unicode MS" panose="020B0604020202020204" pitchFamily="34" charset="-120"/>
+            </a:endParaRPr>
+          </a:p>
+        </p:txBody>
+      </p:sp>
+      <p:pic>
+        <p:nvPicPr>
+          <p:cNvPr id="28" name="圖片 27"/>
+          <p:cNvPicPr>
+            <a:picLocks noChangeAspect="1"/>
+          </p:cNvPicPr>
+          <p:nvPr/>
+        </p:nvPicPr>
+        <p:blipFill>
+          <a:blip r:embed="rId5" cstate="print">
+            <a:extLst>
+              <a:ext uri="{28A0092B-C50C-407E-A947-70E740481C1C}">
+                <a14:useLocalDpi xmlns:a14="http://schemas.microsoft.com/office/drawing/2010/main" val="0"/>
+              </a:ext>
+            </a:extLst>
+          </a:blip>
+          <a:stretch>
+            <a:fillRect/>
+          </a:stretch>
+        </p:blipFill>
+        <p:spPr>
+          <a:xfrm>
+            <a:off x="1521540" y="3330131"/>
+            <a:ext cx="719507" cy="601185"/>
+          </a:xfrm>
+          <a:prstGeom prst="rect">
+            <a:avLst/>
+          </a:prstGeom>
+        </p:spPr>
+      </p:pic>
+      <p:sp>
+        <p:nvSpPr>
+          <p:cNvPr id="36" name="文字方塊 35"/>
+          <p:cNvSpPr txBox="1"/>
+          <p:nvPr/>
+        </p:nvSpPr>
+        <p:spPr>
+          <a:xfrm>
+            <a:off x="1498118" y="3592762"/>
+            <a:ext cx="1345690" cy="338554"/>
+          </a:xfrm>
+          <a:prstGeom prst="rect">
+            <a:avLst/>
+          </a:prstGeom>
+          <a:noFill/>
+        </p:spPr>
+        <p:txBody>
+          <a:bodyPr wrap="square" rtlCol="0">
+            <a:spAutoFit/>
+          </a:bodyPr>
+          <a:lstStyle/>
+          <a:p>
+            <a:r>
+              <a:rPr lang="zh-TW" altLang="en-US" sz="1600" dirty="0" smtClean="0">
+                <a:solidFill>
+                  <a:schemeClr val="accent2">
+                    <a:lumMod val="75000"/>
+                  </a:schemeClr>
+                </a:solidFill>
+              </a:rPr>
+              <a:t>現在位置</a:t>
+            </a:r>
+            <a:endParaRPr lang="zh-TW" altLang="en-US" sz="1600" dirty="0">
+              <a:solidFill>
+                <a:schemeClr val="accent2">
+                  <a:lumMod val="75000"/>
+                </a:schemeClr>
+              </a:solidFill>
             </a:endParaRPr>
           </a:p>
         </p:txBody>

</xml_diff>